<commit_message>
re folder structure for slide
</commit_message>
<xml_diff>
--- a/Document/presentation/nam/notify right route.pptx
+++ b/Document/presentation/nam/notify right route.pptx
@@ -267,7 +267,7 @@
           <a:p>
             <a:fld id="{94B1E4EC-92D8-4A33-94B0-5CDDBDDA3BE9}" type="datetimeFigureOut">
               <a:rPr lang="en-US" smtClean="0"/>
-              <a:t>12/11/2015</a:t>
+              <a:t>12/11/15</a:t>
             </a:fld>
             <a:endParaRPr lang="en-US"/>
           </a:p>
@@ -437,7 +437,7 @@
           <a:p>
             <a:fld id="{94B1E4EC-92D8-4A33-94B0-5CDDBDDA3BE9}" type="datetimeFigureOut">
               <a:rPr lang="en-US" smtClean="0"/>
-              <a:t>12/11/2015</a:t>
+              <a:t>12/11/15</a:t>
             </a:fld>
             <a:endParaRPr lang="en-US"/>
           </a:p>
@@ -617,7 +617,7 @@
           <a:p>
             <a:fld id="{94B1E4EC-92D8-4A33-94B0-5CDDBDDA3BE9}" type="datetimeFigureOut">
               <a:rPr lang="en-US" smtClean="0"/>
-              <a:t>12/11/2015</a:t>
+              <a:t>12/11/15</a:t>
             </a:fld>
             <a:endParaRPr lang="en-US"/>
           </a:p>
@@ -787,7 +787,7 @@
           <a:p>
             <a:fld id="{94B1E4EC-92D8-4A33-94B0-5CDDBDDA3BE9}" type="datetimeFigureOut">
               <a:rPr lang="en-US" smtClean="0"/>
-              <a:t>12/11/2015</a:t>
+              <a:t>12/11/15</a:t>
             </a:fld>
             <a:endParaRPr lang="en-US"/>
           </a:p>
@@ -1031,7 +1031,7 @@
           <a:p>
             <a:fld id="{94B1E4EC-92D8-4A33-94B0-5CDDBDDA3BE9}" type="datetimeFigureOut">
               <a:rPr lang="en-US" smtClean="0"/>
-              <a:t>12/11/2015</a:t>
+              <a:t>12/11/15</a:t>
             </a:fld>
             <a:endParaRPr lang="en-US"/>
           </a:p>
@@ -1263,7 +1263,7 @@
           <a:p>
             <a:fld id="{94B1E4EC-92D8-4A33-94B0-5CDDBDDA3BE9}" type="datetimeFigureOut">
               <a:rPr lang="en-US" smtClean="0"/>
-              <a:t>12/11/2015</a:t>
+              <a:t>12/11/15</a:t>
             </a:fld>
             <a:endParaRPr lang="en-US"/>
           </a:p>
@@ -1630,7 +1630,7 @@
           <a:p>
             <a:fld id="{94B1E4EC-92D8-4A33-94B0-5CDDBDDA3BE9}" type="datetimeFigureOut">
               <a:rPr lang="en-US" smtClean="0"/>
-              <a:t>12/11/2015</a:t>
+              <a:t>12/11/15</a:t>
             </a:fld>
             <a:endParaRPr lang="en-US"/>
           </a:p>
@@ -1748,7 +1748,7 @@
           <a:p>
             <a:fld id="{94B1E4EC-92D8-4A33-94B0-5CDDBDDA3BE9}" type="datetimeFigureOut">
               <a:rPr lang="en-US" smtClean="0"/>
-              <a:t>12/11/2015</a:t>
+              <a:t>12/11/15</a:t>
             </a:fld>
             <a:endParaRPr lang="en-US"/>
           </a:p>
@@ -1843,7 +1843,7 @@
           <a:p>
             <a:fld id="{94B1E4EC-92D8-4A33-94B0-5CDDBDDA3BE9}" type="datetimeFigureOut">
               <a:rPr lang="en-US" smtClean="0"/>
-              <a:t>12/11/2015</a:t>
+              <a:t>12/11/15</a:t>
             </a:fld>
             <a:endParaRPr lang="en-US"/>
           </a:p>
@@ -2120,7 +2120,7 @@
           <a:p>
             <a:fld id="{94B1E4EC-92D8-4A33-94B0-5CDDBDDA3BE9}" type="datetimeFigureOut">
               <a:rPr lang="en-US" smtClean="0"/>
-              <a:t>12/11/2015</a:t>
+              <a:t>12/11/15</a:t>
             </a:fld>
             <a:endParaRPr lang="en-US"/>
           </a:p>
@@ -2377,7 +2377,7 @@
           <a:p>
             <a:fld id="{94B1E4EC-92D8-4A33-94B0-5CDDBDDA3BE9}" type="datetimeFigureOut">
               <a:rPr lang="en-US" smtClean="0"/>
-              <a:t>12/11/2015</a:t>
+              <a:t>12/11/15</a:t>
             </a:fld>
             <a:endParaRPr lang="en-US"/>
           </a:p>
@@ -2590,7 +2590,7 @@
           <a:p>
             <a:fld id="{94B1E4EC-92D8-4A33-94B0-5CDDBDDA3BE9}" type="datetimeFigureOut">
               <a:rPr lang="en-US" smtClean="0"/>
-              <a:t>12/11/2015</a:t>
+              <a:t>12/11/15</a:t>
             </a:fld>
             <a:endParaRPr lang="en-US"/>
           </a:p>
@@ -12694,7 +12694,11 @@
             </a:pPr>
             <a:r>
               <a:rPr lang="en-US" dirty="0" smtClean="0"/>
-              <a:t>- Auto detect and notify.</a:t>
+              <a:t>- Auto detect and </a:t>
+            </a:r>
+            <a:r>
+              <a:rPr lang="en-US" dirty="0" smtClean="0"/>
+              <a:t>notify at each motorbike turn.</a:t>
             </a:r>
             <a:endParaRPr lang="en-US" dirty="0"/>
           </a:p>

</xml_diff>